<commit_message>
started development on a python visualization script
</commit_message>
<xml_diff>
--- a/docs/cw_file_format.pptx
+++ b/docs/cw_file_format.pptx
@@ -5,19 +5,20 @@
     <p:sldMasterId id="2147483648" r:id="rId1"/>
   </p:sldMasterIdLst>
   <p:notesMasterIdLst>
-    <p:notesMasterId r:id="rId12"/>
+    <p:notesMasterId r:id="rId13"/>
   </p:notesMasterIdLst>
   <p:sldIdLst>
-    <p:sldId id="273" r:id="rId2"/>
-    <p:sldId id="282" r:id="rId3"/>
-    <p:sldId id="276" r:id="rId4"/>
-    <p:sldId id="274" r:id="rId5"/>
-    <p:sldId id="277" r:id="rId6"/>
-    <p:sldId id="275" r:id="rId7"/>
-    <p:sldId id="278" r:id="rId8"/>
-    <p:sldId id="279" r:id="rId9"/>
-    <p:sldId id="280" r:id="rId10"/>
-    <p:sldId id="281" r:id="rId11"/>
+    <p:sldId id="283" r:id="rId2"/>
+    <p:sldId id="273" r:id="rId3"/>
+    <p:sldId id="282" r:id="rId4"/>
+    <p:sldId id="276" r:id="rId5"/>
+    <p:sldId id="274" r:id="rId6"/>
+    <p:sldId id="277" r:id="rId7"/>
+    <p:sldId id="275" r:id="rId8"/>
+    <p:sldId id="278" r:id="rId9"/>
+    <p:sldId id="279" r:id="rId10"/>
+    <p:sldId id="280" r:id="rId11"/>
+    <p:sldId id="281" r:id="rId12"/>
   </p:sldIdLst>
   <p:sldSz cx="12192000" cy="6858000"/>
   <p:notesSz cx="6858000" cy="9144000"/>
@@ -206,7 +207,7 @@
           <a:p>
             <a:fld id="{0B0BA5B9-8FCD-40C5-B318-FB8FF33E1D7E}" type="datetimeFigureOut">
               <a:rPr lang="en-US" smtClean="0"/>
-              <a:t>6/27/2022</a:t>
+              <a:t>10/17/2023</a:t>
             </a:fld>
             <a:endParaRPr lang="en-US"/>
           </a:p>
@@ -538,7 +539,7 @@
           <a:p>
             <a:fld id="{F548E75E-623A-4CF1-9865-8B725749F4E0}" type="slidenum">
               <a:rPr lang="en-US" smtClean="0"/>
-              <a:t>1</a:t>
+              <a:t>2</a:t>
             </a:fld>
             <a:endParaRPr lang="en-US"/>
           </a:p>
@@ -622,7 +623,7 @@
           <a:p>
             <a:fld id="{F548E75E-623A-4CF1-9865-8B725749F4E0}" type="slidenum">
               <a:rPr lang="en-US" smtClean="0"/>
-              <a:t>2</a:t>
+              <a:t>3</a:t>
             </a:fld>
             <a:endParaRPr lang="en-US"/>
           </a:p>
@@ -788,7 +789,7 @@
           <a:p>
             <a:fld id="{09B2037D-FB89-468D-A0A7-51603FCC15BE}" type="datetimeFigureOut">
               <a:rPr lang="en-US" smtClean="0"/>
-              <a:t>6/27/2022</a:t>
+              <a:t>10/17/2023</a:t>
             </a:fld>
             <a:endParaRPr lang="en-US"/>
           </a:p>
@@ -986,7 +987,7 @@
           <a:p>
             <a:fld id="{09B2037D-FB89-468D-A0A7-51603FCC15BE}" type="datetimeFigureOut">
               <a:rPr lang="en-US" smtClean="0"/>
-              <a:t>6/27/2022</a:t>
+              <a:t>10/17/2023</a:t>
             </a:fld>
             <a:endParaRPr lang="en-US"/>
           </a:p>
@@ -1194,7 +1195,7 @@
           <a:p>
             <a:fld id="{09B2037D-FB89-468D-A0A7-51603FCC15BE}" type="datetimeFigureOut">
               <a:rPr lang="en-US" smtClean="0"/>
-              <a:t>6/27/2022</a:t>
+              <a:t>10/17/2023</a:t>
             </a:fld>
             <a:endParaRPr lang="en-US"/>
           </a:p>
@@ -1392,7 +1393,7 @@
           <a:p>
             <a:fld id="{09B2037D-FB89-468D-A0A7-51603FCC15BE}" type="datetimeFigureOut">
               <a:rPr lang="en-US" smtClean="0"/>
-              <a:t>6/27/2022</a:t>
+              <a:t>10/17/2023</a:t>
             </a:fld>
             <a:endParaRPr lang="en-US"/>
           </a:p>
@@ -1667,7 +1668,7 @@
           <a:p>
             <a:fld id="{09B2037D-FB89-468D-A0A7-51603FCC15BE}" type="datetimeFigureOut">
               <a:rPr lang="en-US" smtClean="0"/>
-              <a:t>6/27/2022</a:t>
+              <a:t>10/17/2023</a:t>
             </a:fld>
             <a:endParaRPr lang="en-US"/>
           </a:p>
@@ -1932,7 +1933,7 @@
           <a:p>
             <a:fld id="{09B2037D-FB89-468D-A0A7-51603FCC15BE}" type="datetimeFigureOut">
               <a:rPr lang="en-US" smtClean="0"/>
-              <a:t>6/27/2022</a:t>
+              <a:t>10/17/2023</a:t>
             </a:fld>
             <a:endParaRPr lang="en-US"/>
           </a:p>
@@ -2344,7 +2345,7 @@
           <a:p>
             <a:fld id="{09B2037D-FB89-468D-A0A7-51603FCC15BE}" type="datetimeFigureOut">
               <a:rPr lang="en-US" smtClean="0"/>
-              <a:t>6/27/2022</a:t>
+              <a:t>10/17/2023</a:t>
             </a:fld>
             <a:endParaRPr lang="en-US"/>
           </a:p>
@@ -2485,7 +2486,7 @@
           <a:p>
             <a:fld id="{09B2037D-FB89-468D-A0A7-51603FCC15BE}" type="datetimeFigureOut">
               <a:rPr lang="en-US" smtClean="0"/>
-              <a:t>6/27/2022</a:t>
+              <a:t>10/17/2023</a:t>
             </a:fld>
             <a:endParaRPr lang="en-US"/>
           </a:p>
@@ -2598,7 +2599,7 @@
           <a:p>
             <a:fld id="{09B2037D-FB89-468D-A0A7-51603FCC15BE}" type="datetimeFigureOut">
               <a:rPr lang="en-US" smtClean="0"/>
-              <a:t>6/27/2022</a:t>
+              <a:t>10/17/2023</a:t>
             </a:fld>
             <a:endParaRPr lang="en-US"/>
           </a:p>
@@ -2909,7 +2910,7 @@
           <a:p>
             <a:fld id="{09B2037D-FB89-468D-A0A7-51603FCC15BE}" type="datetimeFigureOut">
               <a:rPr lang="en-US" smtClean="0"/>
-              <a:t>6/27/2022</a:t>
+              <a:t>10/17/2023</a:t>
             </a:fld>
             <a:endParaRPr lang="en-US"/>
           </a:p>
@@ -3197,7 +3198,7 @@
           <a:p>
             <a:fld id="{09B2037D-FB89-468D-A0A7-51603FCC15BE}" type="datetimeFigureOut">
               <a:rPr lang="en-US" smtClean="0"/>
-              <a:t>6/27/2022</a:t>
+              <a:t>10/17/2023</a:t>
             </a:fld>
             <a:endParaRPr lang="en-US"/>
           </a:p>
@@ -3438,7 +3439,7 @@
           <a:p>
             <a:fld id="{09B2037D-FB89-468D-A0A7-51603FCC15BE}" type="datetimeFigureOut">
               <a:rPr lang="en-US" smtClean="0"/>
-              <a:t>6/27/2022</a:t>
+              <a:t>10/17/2023</a:t>
             </a:fld>
             <a:endParaRPr lang="en-US"/>
           </a:p>
@@ -3839,6 +3840,1167 @@
 </file>
 
 <file path=ppt/slides/slide1.xml><?xml version="1.0" encoding="utf-8"?>
+<p:sld xmlns:a="http://schemas.openxmlformats.org/drawingml/2006/main" xmlns:r="http://schemas.openxmlformats.org/officeDocument/2006/relationships" xmlns:p="http://schemas.openxmlformats.org/presentationml/2006/main">
+  <p:cSld>
+    <p:spTree>
+      <p:nvGrpSpPr>
+        <p:cNvPr id="1" name=""/>
+        <p:cNvGrpSpPr/>
+        <p:nvPr/>
+      </p:nvGrpSpPr>
+      <p:grpSpPr>
+        <a:xfrm>
+          <a:off x="0" y="0"/>
+          <a:ext cx="0" cy="0"/>
+          <a:chOff x="0" y="0"/>
+          <a:chExt cx="0" cy="0"/>
+        </a:xfrm>
+      </p:grpSpPr>
+      <p:sp>
+        <p:nvSpPr>
+          <p:cNvPr id="2" name="TextBox 1">
+            <a:extLst>
+              <a:ext uri="{FF2B5EF4-FFF2-40B4-BE49-F238E27FC236}">
+                <a16:creationId xmlns:a16="http://schemas.microsoft.com/office/drawing/2014/main" id="{95E427FE-BBD8-B8D1-E568-88D84D6955AF}"/>
+              </a:ext>
+            </a:extLst>
+          </p:cNvPr>
+          <p:cNvSpPr txBox="1"/>
+          <p:nvPr/>
+        </p:nvSpPr>
+        <p:spPr>
+          <a:xfrm>
+            <a:off x="-76794" y="134223"/>
+            <a:ext cx="10100589" cy="923330"/>
+          </a:xfrm>
+          <a:prstGeom prst="rect">
+            <a:avLst/>
+          </a:prstGeom>
+          <a:noFill/>
+        </p:spPr>
+        <p:txBody>
+          <a:bodyPr wrap="square" rtlCol="0">
+            <a:spAutoFit/>
+          </a:bodyPr>
+          <a:lstStyle/>
+          <a:p>
+            <a:r>
+              <a:rPr lang="en-US" dirty="0"/>
+              <a:t>byte (bool)	</a:t>
+            </a:r>
+            <a:r>
+              <a:rPr lang="en-US" dirty="0" err="1"/>
+              <a:t>is_volume</a:t>
+            </a:r>
+            <a:r>
+              <a:rPr lang="en-US" dirty="0"/>
+              <a:t>	</a:t>
+            </a:r>
+            <a:r>
+              <a:rPr lang="en-US" dirty="0" err="1"/>
+              <a:t>boolean</a:t>
+            </a:r>
+            <a:r>
+              <a:rPr lang="en-US" dirty="0"/>
+              <a:t> to flag a heterogeneous volume</a:t>
+            </a:r>
+          </a:p>
+          <a:p>
+            <a:r>
+              <a:rPr lang="en-US" dirty="0"/>
+              <a:t>unsigned int64 	precision		output precision (4 or 8 bit)</a:t>
+            </a:r>
+          </a:p>
+          <a:p>
+            <a:r>
+              <a:rPr lang="en-US" dirty="0"/>
+              <a:t>unsigned int64	Pi		number of incident plane waves</a:t>
+            </a:r>
+          </a:p>
+        </p:txBody>
+      </p:sp>
+      <p:sp>
+        <p:nvSpPr>
+          <p:cNvPr id="3" name="Rectangle 2">
+            <a:extLst>
+              <a:ext uri="{FF2B5EF4-FFF2-40B4-BE49-F238E27FC236}">
+                <a16:creationId xmlns:a16="http://schemas.microsoft.com/office/drawing/2014/main" id="{8352B8DF-9A2A-CC87-5A56-4819FA71952F}"/>
+              </a:ext>
+            </a:extLst>
+          </p:cNvPr>
+          <p:cNvSpPr/>
+          <p:nvPr/>
+        </p:nvSpPr>
+        <p:spPr>
+          <a:xfrm>
+            <a:off x="28069" y="1057553"/>
+            <a:ext cx="7716353" cy="594551"/>
+          </a:xfrm>
+          <a:prstGeom prst="rect">
+            <a:avLst/>
+          </a:prstGeom>
+          <a:solidFill>
+            <a:schemeClr val="accent1">
+              <a:lumMod val="40000"/>
+              <a:lumOff val="60000"/>
+            </a:schemeClr>
+          </a:solidFill>
+          <a:ln>
+            <a:solidFill>
+              <a:schemeClr val="tx1"/>
+            </a:solidFill>
+          </a:ln>
+        </p:spPr>
+        <p:style>
+          <a:lnRef idx="2">
+            <a:schemeClr val="accent1">
+              <a:shade val="15000"/>
+            </a:schemeClr>
+          </a:lnRef>
+          <a:fillRef idx="1">
+            <a:schemeClr val="accent1"/>
+          </a:fillRef>
+          <a:effectRef idx="0">
+            <a:schemeClr val="accent1"/>
+          </a:effectRef>
+          <a:fontRef idx="minor">
+            <a:schemeClr val="lt1"/>
+          </a:fontRef>
+        </p:style>
+        <p:txBody>
+          <a:bodyPr rtlCol="0" anchor="ctr"/>
+          <a:lstStyle/>
+          <a:p>
+            <a:r>
+              <a:rPr lang="en-US" dirty="0">
+                <a:solidFill>
+                  <a:schemeClr val="tx1"/>
+                </a:solidFill>
+              </a:rPr>
+              <a:t>Incident Plane Waves</a:t>
+            </a:r>
+          </a:p>
+        </p:txBody>
+      </p:sp>
+      <p:sp>
+        <p:nvSpPr>
+          <p:cNvPr id="5" name="TextBox 4">
+            <a:extLst>
+              <a:ext uri="{FF2B5EF4-FFF2-40B4-BE49-F238E27FC236}">
+                <a16:creationId xmlns:a16="http://schemas.microsoft.com/office/drawing/2014/main" id="{62AACD3D-F00A-CAF2-CDA3-6B9F4D319A0C}"/>
+              </a:ext>
+            </a:extLst>
+          </p:cNvPr>
+          <p:cNvSpPr txBox="1"/>
+          <p:nvPr/>
+        </p:nvSpPr>
+        <p:spPr>
+          <a:xfrm>
+            <a:off x="-76793" y="1652104"/>
+            <a:ext cx="5979522" cy="369332"/>
+          </a:xfrm>
+          <a:prstGeom prst="rect">
+            <a:avLst/>
+          </a:prstGeom>
+          <a:noFill/>
+        </p:spPr>
+        <p:txBody>
+          <a:bodyPr wrap="none" rtlCol="0">
+            <a:spAutoFit/>
+          </a:bodyPr>
+          <a:lstStyle/>
+          <a:p>
+            <a:r>
+              <a:rPr lang="en-US" dirty="0"/>
+              <a:t>unsigned int64 	</a:t>
+            </a:r>
+            <a:r>
+              <a:rPr lang="en-US" dirty="0" err="1"/>
+              <a:t>num_boundaries</a:t>
+            </a:r>
+            <a:r>
+              <a:rPr lang="en-US" dirty="0"/>
+              <a:t>	number of boundaries</a:t>
+            </a:r>
+          </a:p>
+        </p:txBody>
+      </p:sp>
+      <p:sp>
+        <p:nvSpPr>
+          <p:cNvPr id="6" name="Rectangle 5">
+            <a:extLst>
+              <a:ext uri="{FF2B5EF4-FFF2-40B4-BE49-F238E27FC236}">
+                <a16:creationId xmlns:a16="http://schemas.microsoft.com/office/drawing/2014/main" id="{DBE9B875-CDE0-7621-7230-C1DCDAEAA8EC}"/>
+              </a:ext>
+            </a:extLst>
+          </p:cNvPr>
+          <p:cNvSpPr/>
+          <p:nvPr/>
+        </p:nvSpPr>
+        <p:spPr>
+          <a:xfrm>
+            <a:off x="28069" y="2021437"/>
+            <a:ext cx="7716353" cy="2325912"/>
+          </a:xfrm>
+          <a:prstGeom prst="rect">
+            <a:avLst/>
+          </a:prstGeom>
+          <a:solidFill>
+            <a:schemeClr val="accent1">
+              <a:lumMod val="40000"/>
+              <a:lumOff val="60000"/>
+            </a:schemeClr>
+          </a:solidFill>
+          <a:ln>
+            <a:solidFill>
+              <a:schemeClr val="tx1"/>
+            </a:solidFill>
+          </a:ln>
+        </p:spPr>
+        <p:style>
+          <a:lnRef idx="2">
+            <a:schemeClr val="accent1">
+              <a:shade val="15000"/>
+            </a:schemeClr>
+          </a:lnRef>
+          <a:fillRef idx="1">
+            <a:schemeClr val="accent1"/>
+          </a:fillRef>
+          <a:effectRef idx="0">
+            <a:schemeClr val="accent1"/>
+          </a:effectRef>
+          <a:fontRef idx="minor">
+            <a:schemeClr val="lt1"/>
+          </a:fontRef>
+        </p:style>
+        <p:txBody>
+          <a:bodyPr rtlCol="0" anchor="t" anchorCtr="0"/>
+          <a:lstStyle/>
+          <a:p>
+            <a:r>
+              <a:rPr lang="en-US" dirty="0">
+                <a:solidFill>
+                  <a:schemeClr val="tx1"/>
+                </a:solidFill>
+              </a:rPr>
+              <a:t>Boundaries</a:t>
+            </a:r>
+          </a:p>
+          <a:p>
+            <a:r>
+              <a:rPr lang="en-US" dirty="0">
+                <a:solidFill>
+                  <a:schemeClr val="tx1"/>
+                </a:solidFill>
+              </a:rPr>
+              <a:t>	</a:t>
+            </a:r>
+            <a:r>
+              <a:rPr lang="en-US" dirty="0" err="1">
+                <a:solidFill>
+                  <a:schemeClr val="tx1"/>
+                </a:solidFill>
+              </a:rPr>
+              <a:t>dtype</a:t>
+            </a:r>
+            <a:r>
+              <a:rPr lang="en-US" dirty="0">
+                <a:solidFill>
+                  <a:schemeClr val="tx1"/>
+                </a:solidFill>
+              </a:rPr>
+              <a:t>		z	boundary position</a:t>
+            </a:r>
+          </a:p>
+          <a:p>
+            <a:r>
+              <a:rPr lang="en-US" dirty="0">
+                <a:solidFill>
+                  <a:schemeClr val="tx1"/>
+                </a:solidFill>
+              </a:rPr>
+              <a:t>	unsigned int64	Ri	number of reflected waves</a:t>
+            </a:r>
+          </a:p>
+          <a:p>
+            <a:endParaRPr lang="en-US" dirty="0">
+              <a:solidFill>
+                <a:schemeClr val="tx1"/>
+              </a:solidFill>
+            </a:endParaRPr>
+          </a:p>
+          <a:p>
+            <a:r>
+              <a:rPr lang="en-US" dirty="0">
+                <a:solidFill>
+                  <a:schemeClr val="tx1"/>
+                </a:solidFill>
+              </a:rPr>
+              <a:t>	</a:t>
+            </a:r>
+          </a:p>
+          <a:p>
+            <a:r>
+              <a:rPr lang="en-US" dirty="0">
+                <a:solidFill>
+                  <a:schemeClr val="tx1"/>
+                </a:solidFill>
+              </a:rPr>
+              <a:t>	unsigned int64	Ti	number of transmitted waves</a:t>
+            </a:r>
+          </a:p>
+        </p:txBody>
+      </p:sp>
+      <p:sp>
+        <p:nvSpPr>
+          <p:cNvPr id="7" name="Rectangle 6">
+            <a:extLst>
+              <a:ext uri="{FF2B5EF4-FFF2-40B4-BE49-F238E27FC236}">
+                <a16:creationId xmlns:a16="http://schemas.microsoft.com/office/drawing/2014/main" id="{DB7CEA51-6F13-E85B-7C2F-CD127899445C}"/>
+              </a:ext>
+            </a:extLst>
+          </p:cNvPr>
+          <p:cNvSpPr/>
+          <p:nvPr/>
+        </p:nvSpPr>
+        <p:spPr>
+          <a:xfrm>
+            <a:off x="1037078" y="2913952"/>
+            <a:ext cx="4520735" cy="523413"/>
+          </a:xfrm>
+          <a:prstGeom prst="rect">
+            <a:avLst/>
+          </a:prstGeom>
+          <a:solidFill>
+            <a:schemeClr val="accent2">
+              <a:lumMod val="40000"/>
+              <a:lumOff val="60000"/>
+            </a:schemeClr>
+          </a:solidFill>
+          <a:ln>
+            <a:solidFill>
+              <a:schemeClr val="tx1"/>
+            </a:solidFill>
+          </a:ln>
+        </p:spPr>
+        <p:style>
+          <a:lnRef idx="2">
+            <a:schemeClr val="accent1">
+              <a:shade val="15000"/>
+            </a:schemeClr>
+          </a:lnRef>
+          <a:fillRef idx="1">
+            <a:schemeClr val="accent1"/>
+          </a:fillRef>
+          <a:effectRef idx="0">
+            <a:schemeClr val="accent1"/>
+          </a:effectRef>
+          <a:fontRef idx="minor">
+            <a:schemeClr val="lt1"/>
+          </a:fontRef>
+        </p:style>
+        <p:txBody>
+          <a:bodyPr rtlCol="0" anchor="ctr"/>
+          <a:lstStyle/>
+          <a:p>
+            <a:r>
+              <a:rPr lang="en-US" dirty="0">
+                <a:solidFill>
+                  <a:schemeClr val="tx1"/>
+                </a:solidFill>
+              </a:rPr>
+              <a:t>Reflected Plane Waves</a:t>
+            </a:r>
+          </a:p>
+        </p:txBody>
+      </p:sp>
+      <p:sp>
+        <p:nvSpPr>
+          <p:cNvPr id="8" name="Rectangle 7">
+            <a:extLst>
+              <a:ext uri="{FF2B5EF4-FFF2-40B4-BE49-F238E27FC236}">
+                <a16:creationId xmlns:a16="http://schemas.microsoft.com/office/drawing/2014/main" id="{5DABB74B-6248-2842-CFD0-7E25BFB4A183}"/>
+              </a:ext>
+            </a:extLst>
+          </p:cNvPr>
+          <p:cNvSpPr/>
+          <p:nvPr/>
+        </p:nvSpPr>
+        <p:spPr>
+          <a:xfrm>
+            <a:off x="1037078" y="3752128"/>
+            <a:ext cx="4520735" cy="523413"/>
+          </a:xfrm>
+          <a:prstGeom prst="rect">
+            <a:avLst/>
+          </a:prstGeom>
+          <a:solidFill>
+            <a:schemeClr val="accent3">
+              <a:lumMod val="40000"/>
+              <a:lumOff val="60000"/>
+            </a:schemeClr>
+          </a:solidFill>
+          <a:ln>
+            <a:solidFill>
+              <a:schemeClr val="tx1"/>
+            </a:solidFill>
+          </a:ln>
+        </p:spPr>
+        <p:style>
+          <a:lnRef idx="2">
+            <a:schemeClr val="accent1">
+              <a:shade val="15000"/>
+            </a:schemeClr>
+          </a:lnRef>
+          <a:fillRef idx="1">
+            <a:schemeClr val="accent1"/>
+          </a:fillRef>
+          <a:effectRef idx="0">
+            <a:schemeClr val="accent1"/>
+          </a:effectRef>
+          <a:fontRef idx="minor">
+            <a:schemeClr val="lt1"/>
+          </a:fontRef>
+        </p:style>
+        <p:txBody>
+          <a:bodyPr rtlCol="0" anchor="ctr"/>
+          <a:lstStyle/>
+          <a:p>
+            <a:r>
+              <a:rPr lang="en-US" dirty="0">
+                <a:solidFill>
+                  <a:schemeClr val="tx1"/>
+                </a:solidFill>
+              </a:rPr>
+              <a:t>Transmitted Plane Waves</a:t>
+            </a:r>
+          </a:p>
+        </p:txBody>
+      </p:sp>
+      <p:sp>
+        <p:nvSpPr>
+          <p:cNvPr id="10" name="Rectangle: Rounded Corners 9">
+            <a:extLst>
+              <a:ext uri="{FF2B5EF4-FFF2-40B4-BE49-F238E27FC236}">
+                <a16:creationId xmlns:a16="http://schemas.microsoft.com/office/drawing/2014/main" id="{84EC904A-76A6-8306-C0A4-7637D3E7E379}"/>
+              </a:ext>
+            </a:extLst>
+          </p:cNvPr>
+          <p:cNvSpPr/>
+          <p:nvPr/>
+        </p:nvSpPr>
+        <p:spPr>
+          <a:xfrm>
+            <a:off x="28069" y="4447868"/>
+            <a:ext cx="7716353" cy="2325912"/>
+          </a:xfrm>
+          <a:prstGeom prst="roundRect">
+            <a:avLst>
+              <a:gd name="adj" fmla="val 6411"/>
+            </a:avLst>
+          </a:prstGeom>
+          <a:solidFill>
+            <a:schemeClr val="accent1">
+              <a:lumMod val="40000"/>
+              <a:lumOff val="60000"/>
+            </a:schemeClr>
+          </a:solidFill>
+        </p:spPr>
+        <p:style>
+          <a:lnRef idx="2">
+            <a:schemeClr val="accent1">
+              <a:shade val="15000"/>
+            </a:schemeClr>
+          </a:lnRef>
+          <a:fillRef idx="1">
+            <a:schemeClr val="accent1"/>
+          </a:fillRef>
+          <a:effectRef idx="0">
+            <a:schemeClr val="accent1"/>
+          </a:effectRef>
+          <a:fontRef idx="minor">
+            <a:schemeClr val="lt1"/>
+          </a:fontRef>
+        </p:style>
+        <p:txBody>
+          <a:bodyPr rtlCol="0" anchor="t" anchorCtr="0"/>
+          <a:lstStyle/>
+          <a:p>
+            <a:r>
+              <a:rPr lang="en-US" b="1" dirty="0">
+                <a:solidFill>
+                  <a:schemeClr val="tx1"/>
+                </a:solidFill>
+              </a:rPr>
+              <a:t>if heterogeneous</a:t>
+            </a:r>
+          </a:p>
+          <a:p>
+            <a:r>
+              <a:rPr lang="en-US" dirty="0">
+                <a:solidFill>
+                  <a:schemeClr val="tx1"/>
+                </a:solidFill>
+              </a:rPr>
+              <a:t>int32 * 2		M[2]		number of coefficients along X and Y</a:t>
+            </a:r>
+          </a:p>
+          <a:p>
+            <a:r>
+              <a:rPr lang="en-US" dirty="0" err="1">
+                <a:solidFill>
+                  <a:schemeClr val="tx1"/>
+                </a:solidFill>
+              </a:rPr>
+              <a:t>dtype</a:t>
+            </a:r>
+            <a:r>
+              <a:rPr lang="en-US" dirty="0">
+                <a:solidFill>
+                  <a:schemeClr val="tx1"/>
+                </a:solidFill>
+              </a:rPr>
+              <a:t> * 3		dim[3]		sample dimension along all three axes</a:t>
+            </a:r>
+          </a:p>
+          <a:p>
+            <a:r>
+              <a:rPr lang="en-US" dirty="0">
+                <a:solidFill>
+                  <a:schemeClr val="tx1"/>
+                </a:solidFill>
+              </a:rPr>
+              <a:t>unsigned int32	</a:t>
+            </a:r>
+            <a:r>
+              <a:rPr lang="en-US" dirty="0" err="1">
+                <a:solidFill>
+                  <a:schemeClr val="tx1"/>
+                </a:solidFill>
+              </a:rPr>
+              <a:t>num_layers</a:t>
+            </a:r>
+            <a:r>
+              <a:rPr lang="en-US" dirty="0">
+                <a:solidFill>
+                  <a:schemeClr val="tx1"/>
+                </a:solidFill>
+              </a:rPr>
+              <a:t>	number of heterogeneous layers along Z</a:t>
+            </a:r>
+          </a:p>
+          <a:p>
+            <a:endParaRPr lang="en-US" dirty="0">
+              <a:solidFill>
+                <a:schemeClr val="tx1"/>
+              </a:solidFill>
+            </a:endParaRPr>
+          </a:p>
+        </p:txBody>
+      </p:sp>
+      <p:sp>
+        <p:nvSpPr>
+          <p:cNvPr id="11" name="Rectangle 10">
+            <a:extLst>
+              <a:ext uri="{FF2B5EF4-FFF2-40B4-BE49-F238E27FC236}">
+                <a16:creationId xmlns:a16="http://schemas.microsoft.com/office/drawing/2014/main" id="{B1E69BED-B37D-77A4-FBA6-2CE28E065D4D}"/>
+              </a:ext>
+            </a:extLst>
+          </p:cNvPr>
+          <p:cNvSpPr/>
+          <p:nvPr/>
+        </p:nvSpPr>
+        <p:spPr>
+          <a:xfrm>
+            <a:off x="1037077" y="5724493"/>
+            <a:ext cx="4520735" cy="523413"/>
+          </a:xfrm>
+          <a:prstGeom prst="rect">
+            <a:avLst/>
+          </a:prstGeom>
+          <a:solidFill>
+            <a:schemeClr val="accent4">
+              <a:lumMod val="40000"/>
+              <a:lumOff val="60000"/>
+            </a:schemeClr>
+          </a:solidFill>
+          <a:ln>
+            <a:solidFill>
+              <a:schemeClr val="tx1"/>
+            </a:solidFill>
+          </a:ln>
+        </p:spPr>
+        <p:style>
+          <a:lnRef idx="2">
+            <a:schemeClr val="accent1">
+              <a:shade val="15000"/>
+            </a:schemeClr>
+          </a:lnRef>
+          <a:fillRef idx="1">
+            <a:schemeClr val="accent1"/>
+          </a:fillRef>
+          <a:effectRef idx="0">
+            <a:schemeClr val="accent1"/>
+          </a:effectRef>
+          <a:fontRef idx="minor">
+            <a:schemeClr val="lt1"/>
+          </a:fontRef>
+        </p:style>
+        <p:txBody>
+          <a:bodyPr rtlCol="0" anchor="ctr"/>
+          <a:lstStyle/>
+          <a:p>
+            <a:r>
+              <a:rPr lang="en-US" dirty="0">
+                <a:solidFill>
+                  <a:schemeClr val="tx1"/>
+                </a:solidFill>
+              </a:rPr>
+              <a:t>Heterogeneous Layers</a:t>
+            </a:r>
+          </a:p>
+        </p:txBody>
+      </p:sp>
+      <p:sp>
+        <p:nvSpPr>
+          <p:cNvPr id="12" name="Rectangle 11">
+            <a:extLst>
+              <a:ext uri="{FF2B5EF4-FFF2-40B4-BE49-F238E27FC236}">
+                <a16:creationId xmlns:a16="http://schemas.microsoft.com/office/drawing/2014/main" id="{763EECA0-0FDA-D0DC-D48E-5AC055FFCA4C}"/>
+              </a:ext>
+            </a:extLst>
+          </p:cNvPr>
+          <p:cNvSpPr/>
+          <p:nvPr/>
+        </p:nvSpPr>
+        <p:spPr>
+          <a:xfrm>
+            <a:off x="7889967" y="1057553"/>
+            <a:ext cx="4278328" cy="3713230"/>
+          </a:xfrm>
+          <a:prstGeom prst="rect">
+            <a:avLst/>
+          </a:prstGeom>
+          <a:solidFill>
+            <a:schemeClr val="accent4">
+              <a:lumMod val="40000"/>
+              <a:lumOff val="60000"/>
+            </a:schemeClr>
+          </a:solidFill>
+          <a:ln>
+            <a:solidFill>
+              <a:schemeClr val="tx1"/>
+            </a:solidFill>
+          </a:ln>
+        </p:spPr>
+        <p:style>
+          <a:lnRef idx="2">
+            <a:schemeClr val="accent1">
+              <a:shade val="15000"/>
+            </a:schemeClr>
+          </a:lnRef>
+          <a:fillRef idx="1">
+            <a:schemeClr val="accent1"/>
+          </a:fillRef>
+          <a:effectRef idx="0">
+            <a:schemeClr val="accent1"/>
+          </a:effectRef>
+          <a:fontRef idx="minor">
+            <a:schemeClr val="lt1"/>
+          </a:fontRef>
+        </p:style>
+        <p:txBody>
+          <a:bodyPr rtlCol="0" anchor="t" anchorCtr="0"/>
+          <a:lstStyle/>
+          <a:p>
+            <a:r>
+              <a:rPr lang="en-US" dirty="0">
+                <a:solidFill>
+                  <a:schemeClr val="tx1"/>
+                </a:solidFill>
+              </a:rPr>
+              <a:t>Heterogeneous Layers</a:t>
+            </a:r>
+          </a:p>
+          <a:p>
+            <a:endParaRPr lang="en-US" dirty="0">
+              <a:solidFill>
+                <a:schemeClr val="tx1"/>
+              </a:solidFill>
+            </a:endParaRPr>
+          </a:p>
+          <a:p>
+            <a:r>
+              <a:rPr lang="en-US" dirty="0">
+                <a:solidFill>
+                  <a:schemeClr val="tx1"/>
+                </a:solidFill>
+              </a:rPr>
+              <a:t>complex * M[0] * M[1] * 4	    beta</a:t>
+            </a:r>
+          </a:p>
+          <a:p>
+            <a:r>
+              <a:rPr lang="en-US" dirty="0">
+                <a:solidFill>
+                  <a:schemeClr val="tx1"/>
+                </a:solidFill>
+              </a:rPr>
+              <a:t>complex * M[0] * M[1] * 4	    gamma</a:t>
+            </a:r>
+          </a:p>
+          <a:p>
+            <a:r>
+              <a:rPr lang="en-US" dirty="0">
+                <a:solidFill>
+                  <a:schemeClr val="tx1"/>
+                </a:solidFill>
+              </a:rPr>
+              <a:t>complex * (M[0] * M[1] * 4)^2  gg</a:t>
+            </a:r>
+          </a:p>
+          <a:p>
+            <a:r>
+              <a:rPr lang="en-US" dirty="0">
+                <a:solidFill>
+                  <a:schemeClr val="tx1"/>
+                </a:solidFill>
+              </a:rPr>
+              <a:t>complex * M[0] * M[1]	    </a:t>
+            </a:r>
+            <a:r>
+              <a:rPr lang="en-US" dirty="0" err="1">
+                <a:solidFill>
+                  <a:schemeClr val="tx1"/>
+                </a:solidFill>
+              </a:rPr>
+              <a:t>ft_RI</a:t>
+            </a:r>
+            <a:endParaRPr lang="en-US" dirty="0">
+              <a:solidFill>
+                <a:schemeClr val="tx1"/>
+              </a:solidFill>
+            </a:endParaRPr>
+          </a:p>
+        </p:txBody>
+      </p:sp>
+      <p:cxnSp>
+        <p:nvCxnSpPr>
+          <p:cNvPr id="14" name="Straight Arrow Connector 13">
+            <a:extLst>
+              <a:ext uri="{FF2B5EF4-FFF2-40B4-BE49-F238E27FC236}">
+                <a16:creationId xmlns:a16="http://schemas.microsoft.com/office/drawing/2014/main" id="{6D1FE63E-7F49-796A-BB08-2CFF03ECF34E}"/>
+              </a:ext>
+            </a:extLst>
+          </p:cNvPr>
+          <p:cNvCxnSpPr/>
+          <p:nvPr/>
+        </p:nvCxnSpPr>
+        <p:spPr>
+          <a:xfrm flipV="1">
+            <a:off x="10967752" y="2777828"/>
+            <a:ext cx="145774" cy="512418"/>
+          </a:xfrm>
+          <a:prstGeom prst="straightConnector1">
+            <a:avLst/>
+          </a:prstGeom>
+          <a:ln w="57150">
+            <a:solidFill>
+              <a:schemeClr val="tx1"/>
+            </a:solidFill>
+            <a:tailEnd type="triangle"/>
+          </a:ln>
+        </p:spPr>
+        <p:style>
+          <a:lnRef idx="1">
+            <a:schemeClr val="accent1"/>
+          </a:lnRef>
+          <a:fillRef idx="0">
+            <a:schemeClr val="accent1"/>
+          </a:fillRef>
+          <a:effectRef idx="0">
+            <a:schemeClr val="accent1"/>
+          </a:effectRef>
+          <a:fontRef idx="minor">
+            <a:schemeClr val="tx1"/>
+          </a:fontRef>
+        </p:style>
+      </p:cxnSp>
+      <mc:AlternateContent xmlns:mc="http://schemas.openxmlformats.org/markup-compatibility/2006">
+        <mc:Choice xmlns:a14="http://schemas.microsoft.com/office/drawing/2010/main" Requires="a14">
+          <p:sp>
+            <p:nvSpPr>
+              <p:cNvPr id="15" name="TextBox 14">
+                <a:extLst>
+                  <a:ext uri="{FF2B5EF4-FFF2-40B4-BE49-F238E27FC236}">
+                    <a16:creationId xmlns:a16="http://schemas.microsoft.com/office/drawing/2014/main" id="{A861A196-83D0-B03C-5675-400A0B37E4CB}"/>
+                  </a:ext>
+                </a:extLst>
+              </p:cNvPr>
+              <p:cNvSpPr txBox="1"/>
+              <p:nvPr/>
+            </p:nvSpPr>
+            <p:spPr>
+              <a:xfrm>
+                <a:off x="8905952" y="3252849"/>
+                <a:ext cx="2980303" cy="520655"/>
+              </a:xfrm>
+              <a:prstGeom prst="rect">
+                <a:avLst/>
+              </a:prstGeom>
+              <a:noFill/>
+            </p:spPr>
+            <p:txBody>
+              <a:bodyPr wrap="none" rtlCol="0">
+                <a:spAutoFit/>
+              </a:bodyPr>
+              <a:lstStyle/>
+              <a:p>
+                <a:r>
+                  <a:rPr lang="en-US" dirty="0"/>
+                  <a:t>Fourier coefficients of </a:t>
+                </a:r>
+                <a14:m>
+                  <m:oMath xmlns:m="http://schemas.openxmlformats.org/officeDocument/2006/math">
+                    <m:f>
+                      <m:fPr>
+                        <m:ctrlPr>
+                          <a:rPr lang="en-US" i="1" smtClean="0">
+                            <a:latin typeface="Cambria Math" panose="02040503050406030204" pitchFamily="18" charset="0"/>
+                          </a:rPr>
+                        </m:ctrlPr>
+                      </m:fPr>
+                      <m:num>
+                        <m:r>
+                          <a:rPr lang="en-US" b="0" i="1" smtClean="0">
+                            <a:latin typeface="Cambria Math" panose="02040503050406030204" pitchFamily="18" charset="0"/>
+                          </a:rPr>
+                          <m:t>1</m:t>
+                        </m:r>
+                      </m:num>
+                      <m:den>
+                        <m:sSup>
+                          <m:sSupPr>
+                            <m:ctrlPr>
+                              <a:rPr lang="en-US" b="0" i="1" smtClean="0">
+                                <a:latin typeface="Cambria Math" panose="02040503050406030204" pitchFamily="18" charset="0"/>
+                              </a:rPr>
+                            </m:ctrlPr>
+                          </m:sSupPr>
+                          <m:e>
+                            <m:r>
+                              <a:rPr lang="en-US" b="0" i="1" smtClean="0">
+                                <a:latin typeface="Cambria Math" panose="02040503050406030204" pitchFamily="18" charset="0"/>
+                              </a:rPr>
+                              <m:t>𝑛</m:t>
+                            </m:r>
+                          </m:e>
+                          <m:sup>
+                            <m:r>
+                              <a:rPr lang="en-US" b="0" i="1" smtClean="0">
+                                <a:latin typeface="Cambria Math" panose="02040503050406030204" pitchFamily="18" charset="0"/>
+                              </a:rPr>
+                              <m:t>2</m:t>
+                            </m:r>
+                          </m:sup>
+                        </m:sSup>
+                        <m:r>
+                          <a:rPr lang="en-US" b="0" i="1" smtClean="0">
+                            <a:latin typeface="Cambria Math" panose="02040503050406030204" pitchFamily="18" charset="0"/>
+                          </a:rPr>
+                          <m:t>(</m:t>
+                        </m:r>
+                        <m:r>
+                          <a:rPr lang="en-US" b="0" i="1" smtClean="0">
+                            <a:latin typeface="Cambria Math" panose="02040503050406030204" pitchFamily="18" charset="0"/>
+                          </a:rPr>
+                          <m:t>𝑥</m:t>
+                        </m:r>
+                        <m:r>
+                          <a:rPr lang="en-US" b="0" i="1" smtClean="0">
+                            <a:latin typeface="Cambria Math" panose="02040503050406030204" pitchFamily="18" charset="0"/>
+                          </a:rPr>
+                          <m:t>,</m:t>
+                        </m:r>
+                        <m:r>
+                          <a:rPr lang="en-US" b="0" i="1" smtClean="0">
+                            <a:latin typeface="Cambria Math" panose="02040503050406030204" pitchFamily="18" charset="0"/>
+                          </a:rPr>
+                          <m:t>𝑦</m:t>
+                        </m:r>
+                        <m:r>
+                          <a:rPr lang="en-US" b="0" i="1" smtClean="0">
+                            <a:latin typeface="Cambria Math" panose="02040503050406030204" pitchFamily="18" charset="0"/>
+                          </a:rPr>
+                          <m:t>)</m:t>
+                        </m:r>
+                      </m:den>
+                    </m:f>
+                  </m:oMath>
+                </a14:m>
+                <a:endParaRPr lang="en-US" dirty="0"/>
+              </a:p>
+            </p:txBody>
+          </p:sp>
+        </mc:Choice>
+        <mc:Fallback>
+          <p:sp>
+            <p:nvSpPr>
+              <p:cNvPr id="15" name="TextBox 14">
+                <a:extLst>
+                  <a:ext uri="{FF2B5EF4-FFF2-40B4-BE49-F238E27FC236}">
+                    <a16:creationId xmlns:a16="http://schemas.microsoft.com/office/drawing/2014/main" id="{A861A196-83D0-B03C-5675-400A0B37E4CB}"/>
+                  </a:ext>
+                </a:extLst>
+              </p:cNvPr>
+              <p:cNvSpPr txBox="1">
+                <a:spLocks noRot="1" noChangeAspect="1" noMove="1" noResize="1" noEditPoints="1" noAdjustHandles="1" noChangeArrowheads="1" noChangeShapeType="1" noTextEdit="1"/>
+              </p:cNvSpPr>
+              <p:nvPr/>
+            </p:nvSpPr>
+            <p:spPr>
+              <a:xfrm>
+                <a:off x="8905952" y="3252849"/>
+                <a:ext cx="2980303" cy="520655"/>
+              </a:xfrm>
+              <a:prstGeom prst="rect">
+                <a:avLst/>
+              </a:prstGeom>
+              <a:blipFill>
+                <a:blip r:embed="rId2"/>
+                <a:stretch>
+                  <a:fillRect l="-1840" b="-7059"/>
+                </a:stretch>
+              </a:blipFill>
+            </p:spPr>
+            <p:txBody>
+              <a:bodyPr/>
+              <a:lstStyle/>
+              <a:p>
+                <a:r>
+                  <a:rPr lang="en-US">
+                    <a:noFill/>
+                  </a:rPr>
+                  <a:t> </a:t>
+                </a:r>
+              </a:p>
+            </p:txBody>
+          </p:sp>
+        </mc:Fallback>
+      </mc:AlternateContent>
+    </p:spTree>
+    <p:extLst>
+      <p:ext uri="{BB962C8B-B14F-4D97-AF65-F5344CB8AC3E}">
+        <p14:creationId xmlns:p14="http://schemas.microsoft.com/office/powerpoint/2010/main" val="3863726343"/>
+      </p:ext>
+    </p:extLst>
+  </p:cSld>
+  <p:clrMapOvr>
+    <a:masterClrMapping/>
+  </p:clrMapOvr>
+</p:sld>
+</file>
+
+<file path=ppt/slides/slide10.xml><?xml version="1.0" encoding="utf-8"?>
+<p:sld xmlns:a="http://schemas.openxmlformats.org/drawingml/2006/main" xmlns:r="http://schemas.openxmlformats.org/officeDocument/2006/relationships" xmlns:p="http://schemas.openxmlformats.org/presentationml/2006/main">
+  <p:cSld>
+    <p:spTree>
+      <p:nvGrpSpPr>
+        <p:cNvPr id="1" name=""/>
+        <p:cNvGrpSpPr/>
+        <p:nvPr/>
+      </p:nvGrpSpPr>
+      <p:grpSpPr>
+        <a:xfrm>
+          <a:off x="0" y="0"/>
+          <a:ext cx="0" cy="0"/>
+          <a:chOff x="0" y="0"/>
+          <a:chExt cx="0" cy="0"/>
+        </a:xfrm>
+      </p:grpSpPr>
+      <p:sp>
+        <p:nvSpPr>
+          <p:cNvPr id="2" name="Title 1">
+            <a:extLst>
+              <a:ext uri="{FF2B5EF4-FFF2-40B4-BE49-F238E27FC236}">
+                <a16:creationId xmlns:a16="http://schemas.microsoft.com/office/drawing/2014/main" id="{ADD29A09-9CC2-43CA-9537-5149C99167AC}"/>
+              </a:ext>
+            </a:extLst>
+          </p:cNvPr>
+          <p:cNvSpPr>
+            <a:spLocks noGrp="1"/>
+          </p:cNvSpPr>
+          <p:nvPr>
+            <p:ph type="title"/>
+          </p:nvPr>
+        </p:nvSpPr>
+        <p:spPr/>
+        <p:txBody>
+          <a:bodyPr/>
+          <a:lstStyle/>
+          <a:p>
+            <a:endParaRPr lang="en-US"/>
+          </a:p>
+        </p:txBody>
+      </p:sp>
+      <p:sp>
+        <p:nvSpPr>
+          <p:cNvPr id="3" name="Content Placeholder 2">
+            <a:extLst>
+              <a:ext uri="{FF2B5EF4-FFF2-40B4-BE49-F238E27FC236}">
+                <a16:creationId xmlns:a16="http://schemas.microsoft.com/office/drawing/2014/main" id="{0BA0D1D2-8FE8-452A-B141-CFDD634F2965}"/>
+              </a:ext>
+            </a:extLst>
+          </p:cNvPr>
+          <p:cNvSpPr>
+            <a:spLocks noGrp="1"/>
+          </p:cNvSpPr>
+          <p:nvPr>
+            <p:ph idx="1"/>
+          </p:nvPr>
+        </p:nvSpPr>
+        <p:spPr/>
+        <p:txBody>
+          <a:bodyPr/>
+          <a:lstStyle/>
+          <a:p>
+            <a:endParaRPr lang="en-US"/>
+          </a:p>
+        </p:txBody>
+      </p:sp>
+      <p:pic>
+        <p:nvPicPr>
+          <p:cNvPr id="5" name="Picture 4">
+            <a:extLst>
+              <a:ext uri="{FF2B5EF4-FFF2-40B4-BE49-F238E27FC236}">
+                <a16:creationId xmlns:a16="http://schemas.microsoft.com/office/drawing/2014/main" id="{48F1C3F1-DFC4-40B7-BFF0-BA3335EE56E4}"/>
+              </a:ext>
+            </a:extLst>
+          </p:cNvPr>
+          <p:cNvPicPr>
+            <a:picLocks noChangeAspect="1"/>
+          </p:cNvPicPr>
+          <p:nvPr/>
+        </p:nvPicPr>
+        <p:blipFill>
+          <a:blip r:embed="rId2"/>
+          <a:stretch>
+            <a:fillRect/>
+          </a:stretch>
+        </p:blipFill>
+        <p:spPr>
+          <a:xfrm>
+            <a:off x="251632" y="0"/>
+            <a:ext cx="11688735" cy="6858000"/>
+          </a:xfrm>
+          <a:prstGeom prst="rect">
+            <a:avLst/>
+          </a:prstGeom>
+        </p:spPr>
+      </p:pic>
+    </p:spTree>
+    <p:extLst>
+      <p:ext uri="{BB962C8B-B14F-4D97-AF65-F5344CB8AC3E}">
+        <p14:creationId xmlns:p14="http://schemas.microsoft.com/office/powerpoint/2010/main" val="3876108278"/>
+      </p:ext>
+    </p:extLst>
+  </p:cSld>
+  <p:clrMapOvr>
+    <a:masterClrMapping/>
+  </p:clrMapOvr>
+</p:sld>
+</file>
+
+<file path=ppt/slides/slide11.xml><?xml version="1.0" encoding="utf-8"?>
+<p:sld xmlns:a="http://schemas.openxmlformats.org/drawingml/2006/main" xmlns:r="http://schemas.openxmlformats.org/officeDocument/2006/relationships" xmlns:p="http://schemas.openxmlformats.org/presentationml/2006/main">
+  <p:cSld>
+    <p:spTree>
+      <p:nvGrpSpPr>
+        <p:cNvPr id="1" name=""/>
+        <p:cNvGrpSpPr/>
+        <p:nvPr/>
+      </p:nvGrpSpPr>
+      <p:grpSpPr>
+        <a:xfrm>
+          <a:off x="0" y="0"/>
+          <a:ext cx="0" cy="0"/>
+          <a:chOff x="0" y="0"/>
+          <a:chExt cx="0" cy="0"/>
+        </a:xfrm>
+      </p:grpSpPr>
+      <p:sp>
+        <p:nvSpPr>
+          <p:cNvPr id="2" name="Title 1">
+            <a:extLst>
+              <a:ext uri="{FF2B5EF4-FFF2-40B4-BE49-F238E27FC236}">
+                <a16:creationId xmlns:a16="http://schemas.microsoft.com/office/drawing/2014/main" id="{4BC613F7-C43D-435D-A77C-99092055943A}"/>
+              </a:ext>
+            </a:extLst>
+          </p:cNvPr>
+          <p:cNvSpPr>
+            <a:spLocks noGrp="1"/>
+          </p:cNvSpPr>
+          <p:nvPr>
+            <p:ph type="title"/>
+          </p:nvPr>
+        </p:nvSpPr>
+        <p:spPr/>
+        <p:txBody>
+          <a:bodyPr/>
+          <a:lstStyle/>
+          <a:p>
+            <a:endParaRPr lang="en-US"/>
+          </a:p>
+        </p:txBody>
+      </p:sp>
+      <p:sp>
+        <p:nvSpPr>
+          <p:cNvPr id="3" name="Content Placeholder 2">
+            <a:extLst>
+              <a:ext uri="{FF2B5EF4-FFF2-40B4-BE49-F238E27FC236}">
+                <a16:creationId xmlns:a16="http://schemas.microsoft.com/office/drawing/2014/main" id="{FBA854C5-21F3-43CD-9788-25A541F3B3D2}"/>
+              </a:ext>
+            </a:extLst>
+          </p:cNvPr>
+          <p:cNvSpPr>
+            <a:spLocks noGrp="1"/>
+          </p:cNvSpPr>
+          <p:nvPr>
+            <p:ph idx="1"/>
+          </p:nvPr>
+        </p:nvSpPr>
+        <p:spPr/>
+        <p:txBody>
+          <a:bodyPr/>
+          <a:lstStyle/>
+          <a:p>
+            <a:r>
+              <a:rPr lang="en-US" dirty="0"/>
+              <a:t>Euler rules</a:t>
+            </a:r>
+          </a:p>
+          <a:p>
+            <a:r>
+              <a:rPr lang="en-US" dirty="0"/>
+              <a:t>quaternions</a:t>
+            </a:r>
+          </a:p>
+        </p:txBody>
+      </p:sp>
+    </p:spTree>
+    <p:extLst>
+      <p:ext uri="{BB962C8B-B14F-4D97-AF65-F5344CB8AC3E}">
+        <p14:creationId xmlns:p14="http://schemas.microsoft.com/office/powerpoint/2010/main" val="1919455630"/>
+      </p:ext>
+    </p:extLst>
+  </p:cSld>
+  <p:clrMapOvr>
+    <a:masterClrMapping/>
+  </p:clrMapOvr>
+</p:sld>
+</file>
+
+<file path=ppt/slides/slide2.xml><?xml version="1.0" encoding="utf-8"?>
 <p:sld xmlns:a="http://schemas.openxmlformats.org/drawingml/2006/main" xmlns:r="http://schemas.openxmlformats.org/officeDocument/2006/relationships" xmlns:p="http://schemas.openxmlformats.org/presentationml/2006/main">
   <p:cSld>
     <p:spTree>
@@ -12073,96 +13235,7 @@
 </p:sld>
 </file>
 
-<file path=ppt/slides/slide10.xml><?xml version="1.0" encoding="utf-8"?>
-<p:sld xmlns:a="http://schemas.openxmlformats.org/drawingml/2006/main" xmlns:r="http://schemas.openxmlformats.org/officeDocument/2006/relationships" xmlns:p="http://schemas.openxmlformats.org/presentationml/2006/main">
-  <p:cSld>
-    <p:spTree>
-      <p:nvGrpSpPr>
-        <p:cNvPr id="1" name=""/>
-        <p:cNvGrpSpPr/>
-        <p:nvPr/>
-      </p:nvGrpSpPr>
-      <p:grpSpPr>
-        <a:xfrm>
-          <a:off x="0" y="0"/>
-          <a:ext cx="0" cy="0"/>
-          <a:chOff x="0" y="0"/>
-          <a:chExt cx="0" cy="0"/>
-        </a:xfrm>
-      </p:grpSpPr>
-      <p:sp>
-        <p:nvSpPr>
-          <p:cNvPr id="2" name="Title 1">
-            <a:extLst>
-              <a:ext uri="{FF2B5EF4-FFF2-40B4-BE49-F238E27FC236}">
-                <a16:creationId xmlns:a16="http://schemas.microsoft.com/office/drawing/2014/main" id="{4BC613F7-C43D-435D-A77C-99092055943A}"/>
-              </a:ext>
-            </a:extLst>
-          </p:cNvPr>
-          <p:cNvSpPr>
-            <a:spLocks noGrp="1"/>
-          </p:cNvSpPr>
-          <p:nvPr>
-            <p:ph type="title"/>
-          </p:nvPr>
-        </p:nvSpPr>
-        <p:spPr/>
-        <p:txBody>
-          <a:bodyPr/>
-          <a:lstStyle/>
-          <a:p>
-            <a:endParaRPr lang="en-US"/>
-          </a:p>
-        </p:txBody>
-      </p:sp>
-      <p:sp>
-        <p:nvSpPr>
-          <p:cNvPr id="3" name="Content Placeholder 2">
-            <a:extLst>
-              <a:ext uri="{FF2B5EF4-FFF2-40B4-BE49-F238E27FC236}">
-                <a16:creationId xmlns:a16="http://schemas.microsoft.com/office/drawing/2014/main" id="{FBA854C5-21F3-43CD-9788-25A541F3B3D2}"/>
-              </a:ext>
-            </a:extLst>
-          </p:cNvPr>
-          <p:cNvSpPr>
-            <a:spLocks noGrp="1"/>
-          </p:cNvSpPr>
-          <p:nvPr>
-            <p:ph idx="1"/>
-          </p:nvPr>
-        </p:nvSpPr>
-        <p:spPr/>
-        <p:txBody>
-          <a:bodyPr/>
-          <a:lstStyle/>
-          <a:p>
-            <a:r>
-              <a:rPr lang="en-US" dirty="0"/>
-              <a:t>Euler rules</a:t>
-            </a:r>
-          </a:p>
-          <a:p>
-            <a:r>
-              <a:rPr lang="en-US" dirty="0"/>
-              <a:t>quaternions</a:t>
-            </a:r>
-          </a:p>
-        </p:txBody>
-      </p:sp>
-    </p:spTree>
-    <p:extLst>
-      <p:ext uri="{BB962C8B-B14F-4D97-AF65-F5344CB8AC3E}">
-        <p14:creationId xmlns:p14="http://schemas.microsoft.com/office/powerpoint/2010/main" val="1919455630"/>
-      </p:ext>
-    </p:extLst>
-  </p:cSld>
-  <p:clrMapOvr>
-    <a:masterClrMapping/>
-  </p:clrMapOvr>
-</p:sld>
-</file>
-
-<file path=ppt/slides/slide2.xml><?xml version="1.0" encoding="utf-8"?>
+<file path=ppt/slides/slide3.xml><?xml version="1.0" encoding="utf-8"?>
 <p:sld xmlns:a="http://schemas.openxmlformats.org/drawingml/2006/main" xmlns:r="http://schemas.openxmlformats.org/officeDocument/2006/relationships" xmlns:p="http://schemas.openxmlformats.org/presentationml/2006/main">
   <p:cSld>
     <p:spTree>
@@ -20363,7 +21436,7 @@
 </p:sld>
 </file>
 
-<file path=ppt/slides/slide3.xml><?xml version="1.0" encoding="utf-8"?>
+<file path=ppt/slides/slide4.xml><?xml version="1.0" encoding="utf-8"?>
 <p:sld xmlns:a="http://schemas.openxmlformats.org/drawingml/2006/main" xmlns:r="http://schemas.openxmlformats.org/officeDocument/2006/relationships" xmlns:p="http://schemas.openxmlformats.org/presentationml/2006/main">
   <p:cSld>
     <p:spTree>
@@ -22392,7 +23465,7 @@
 </p:sld>
 </file>
 
-<file path=ppt/slides/slide4.xml><?xml version="1.0" encoding="utf-8"?>
+<file path=ppt/slides/slide5.xml><?xml version="1.0" encoding="utf-8"?>
 <p:sld xmlns:a="http://schemas.openxmlformats.org/drawingml/2006/main" xmlns:r="http://schemas.openxmlformats.org/officeDocument/2006/relationships" xmlns:p="http://schemas.openxmlformats.org/presentationml/2006/main">
   <p:cSld>
     <p:spTree>
@@ -22640,7 +23713,7 @@
 </p:sld>
 </file>
 
-<file path=ppt/slides/slide5.xml><?xml version="1.0" encoding="utf-8"?>
+<file path=ppt/slides/slide6.xml><?xml version="1.0" encoding="utf-8"?>
 <p:sld xmlns:a="http://schemas.openxmlformats.org/drawingml/2006/main" xmlns:r="http://schemas.openxmlformats.org/officeDocument/2006/relationships" xmlns:p="http://schemas.openxmlformats.org/presentationml/2006/main">
   <p:cSld>
     <p:spTree>
@@ -23660,7 +24733,7 @@
 </p:sld>
 </file>
 
-<file path=ppt/slides/slide6.xml><?xml version="1.0" encoding="utf-8"?>
+<file path=ppt/slides/slide7.xml><?xml version="1.0" encoding="utf-8"?>
 <p:sld xmlns:a="http://schemas.openxmlformats.org/drawingml/2006/main" xmlns:r="http://schemas.openxmlformats.org/officeDocument/2006/relationships" xmlns:p="http://schemas.openxmlformats.org/presentationml/2006/main">
   <p:cSld>
     <p:spTree>
@@ -23807,7 +24880,7 @@
 </p:sld>
 </file>
 
-<file path=ppt/slides/slide7.xml><?xml version="1.0" encoding="utf-8"?>
+<file path=ppt/slides/slide8.xml><?xml version="1.0" encoding="utf-8"?>
 <p:sld xmlns:a="http://schemas.openxmlformats.org/drawingml/2006/main" xmlns:r="http://schemas.openxmlformats.org/officeDocument/2006/relationships" xmlns:p="http://schemas.openxmlformats.org/presentationml/2006/main">
   <p:cSld>
     <p:spTree>
@@ -23887,7 +24960,7 @@
 </p:sld>
 </file>
 
-<file path=ppt/slides/slide8.xml><?xml version="1.0" encoding="utf-8"?>
+<file path=ppt/slides/slide9.xml><?xml version="1.0" encoding="utf-8"?>
 <p:sld xmlns:a="http://schemas.openxmlformats.org/drawingml/2006/main" xmlns:r="http://schemas.openxmlformats.org/officeDocument/2006/relationships" xmlns:p="http://schemas.openxmlformats.org/presentationml/2006/main">
   <p:cSld>
     <p:spTree>
@@ -23988,116 +25061,6 @@
     <p:extLst>
       <p:ext uri="{BB962C8B-B14F-4D97-AF65-F5344CB8AC3E}">
         <p14:creationId xmlns:p14="http://schemas.microsoft.com/office/powerpoint/2010/main" val="1862078866"/>
-      </p:ext>
-    </p:extLst>
-  </p:cSld>
-  <p:clrMapOvr>
-    <a:masterClrMapping/>
-  </p:clrMapOvr>
-</p:sld>
-</file>
-
-<file path=ppt/slides/slide9.xml><?xml version="1.0" encoding="utf-8"?>
-<p:sld xmlns:a="http://schemas.openxmlformats.org/drawingml/2006/main" xmlns:r="http://schemas.openxmlformats.org/officeDocument/2006/relationships" xmlns:p="http://schemas.openxmlformats.org/presentationml/2006/main">
-  <p:cSld>
-    <p:spTree>
-      <p:nvGrpSpPr>
-        <p:cNvPr id="1" name=""/>
-        <p:cNvGrpSpPr/>
-        <p:nvPr/>
-      </p:nvGrpSpPr>
-      <p:grpSpPr>
-        <a:xfrm>
-          <a:off x="0" y="0"/>
-          <a:ext cx="0" cy="0"/>
-          <a:chOff x="0" y="0"/>
-          <a:chExt cx="0" cy="0"/>
-        </a:xfrm>
-      </p:grpSpPr>
-      <p:sp>
-        <p:nvSpPr>
-          <p:cNvPr id="2" name="Title 1">
-            <a:extLst>
-              <a:ext uri="{FF2B5EF4-FFF2-40B4-BE49-F238E27FC236}">
-                <a16:creationId xmlns:a16="http://schemas.microsoft.com/office/drawing/2014/main" id="{ADD29A09-9CC2-43CA-9537-5149C99167AC}"/>
-              </a:ext>
-            </a:extLst>
-          </p:cNvPr>
-          <p:cNvSpPr>
-            <a:spLocks noGrp="1"/>
-          </p:cNvSpPr>
-          <p:nvPr>
-            <p:ph type="title"/>
-          </p:nvPr>
-        </p:nvSpPr>
-        <p:spPr/>
-        <p:txBody>
-          <a:bodyPr/>
-          <a:lstStyle/>
-          <a:p>
-            <a:endParaRPr lang="en-US"/>
-          </a:p>
-        </p:txBody>
-      </p:sp>
-      <p:sp>
-        <p:nvSpPr>
-          <p:cNvPr id="3" name="Content Placeholder 2">
-            <a:extLst>
-              <a:ext uri="{FF2B5EF4-FFF2-40B4-BE49-F238E27FC236}">
-                <a16:creationId xmlns:a16="http://schemas.microsoft.com/office/drawing/2014/main" id="{0BA0D1D2-8FE8-452A-B141-CFDD634F2965}"/>
-              </a:ext>
-            </a:extLst>
-          </p:cNvPr>
-          <p:cNvSpPr>
-            <a:spLocks noGrp="1"/>
-          </p:cNvSpPr>
-          <p:nvPr>
-            <p:ph idx="1"/>
-          </p:nvPr>
-        </p:nvSpPr>
-        <p:spPr/>
-        <p:txBody>
-          <a:bodyPr/>
-          <a:lstStyle/>
-          <a:p>
-            <a:endParaRPr lang="en-US"/>
-          </a:p>
-        </p:txBody>
-      </p:sp>
-      <p:pic>
-        <p:nvPicPr>
-          <p:cNvPr id="5" name="Picture 4">
-            <a:extLst>
-              <a:ext uri="{FF2B5EF4-FFF2-40B4-BE49-F238E27FC236}">
-                <a16:creationId xmlns:a16="http://schemas.microsoft.com/office/drawing/2014/main" id="{48F1C3F1-DFC4-40B7-BFF0-BA3335EE56E4}"/>
-              </a:ext>
-            </a:extLst>
-          </p:cNvPr>
-          <p:cNvPicPr>
-            <a:picLocks noChangeAspect="1"/>
-          </p:cNvPicPr>
-          <p:nvPr/>
-        </p:nvPicPr>
-        <p:blipFill>
-          <a:blip r:embed="rId2"/>
-          <a:stretch>
-            <a:fillRect/>
-          </a:stretch>
-        </p:blipFill>
-        <p:spPr>
-          <a:xfrm>
-            <a:off x="251632" y="0"/>
-            <a:ext cx="11688735" cy="6858000"/>
-          </a:xfrm>
-          <a:prstGeom prst="rect">
-            <a:avLst/>
-          </a:prstGeom>
-        </p:spPr>
-      </p:pic>
-    </p:spTree>
-    <p:extLst>
-      <p:ext uri="{BB962C8B-B14F-4D97-AF65-F5344CB8AC3E}">
-        <p14:creationId xmlns:p14="http://schemas.microsoft.com/office/powerpoint/2010/main" val="3876108278"/>
       </p:ext>
     </p:extLst>
   </p:cSld>

</xml_diff>